<commit_message>
[БД]: invert color .pptx
</commit_message>
<xml_diff>
--- a/3_курс/6_semester/Базы_Данных/Курсовая/Защита.pptx
+++ b/3_курс/6_semester/Базы_Данных/Курсовая/Защита.pptx
@@ -7367,6 +7367,42 @@
           <a:chExt cx="0" cy="0"/>
         </a:xfrm>
       </p:grpSpPr>
+      <p:pic>
+        <p:nvPicPr>
+          <p:cNvPr id="10" name="Рисунок 9">
+            <a:extLst>
+              <a:ext uri="{FF2B5EF4-FFF2-40B4-BE49-F238E27FC236}">
+                <a16:creationId xmlns:a16="http://schemas.microsoft.com/office/drawing/2014/main" id="{024081B6-375F-44A8-AE02-AFE94CFA539C}"/>
+              </a:ext>
+            </a:extLst>
+          </p:cNvPr>
+          <p:cNvPicPr>
+            <a:picLocks noChangeAspect="1"/>
+          </p:cNvPicPr>
+          <p:nvPr/>
+        </p:nvPicPr>
+        <p:blipFill>
+          <a:blip r:embed="rId3">
+            <a:extLst>
+              <a:ext uri="{28A0092B-C50C-407E-A947-70E740481C1C}">
+                <a14:useLocalDpi xmlns:a14="http://schemas.microsoft.com/office/drawing/2010/main" val="0"/>
+              </a:ext>
+            </a:extLst>
+          </a:blip>
+          <a:stretch>
+            <a:fillRect/>
+          </a:stretch>
+        </p:blipFill>
+        <p:spPr>
+          <a:xfrm>
+            <a:off x="0" y="0"/>
+            <a:ext cx="12192000" cy="6858000"/>
+          </a:xfrm>
+          <a:prstGeom prst="rect">
+            <a:avLst/>
+          </a:prstGeom>
+        </p:spPr>
+      </p:pic>
       <p:sp>
         <p:nvSpPr>
           <p:cNvPr id="2" name="Заголовок 1"/>
@@ -7393,7 +7429,7 @@
             <a:r>
               <a:rPr lang="ru-RU" sz="2800" b="1" i="0" dirty="0">
                 <a:solidFill>
-                  <a:schemeClr val="tx1"/>
+                  <a:schemeClr val="bg1"/>
                 </a:solidFill>
                 <a:latin typeface="Garamond"/>
                 <a:ea typeface="+mj-ea"/>
@@ -7430,7 +7466,11 @@
               <a:buNone/>
             </a:pPr>
             <a:r>
-              <a:rPr lang="ru-RU" dirty="0"/>
+              <a:rPr lang="ru-RU" dirty="0">
+                <a:solidFill>
+                  <a:schemeClr val="bg1"/>
+                </a:solidFill>
+              </a:rPr>
               <a:t>Подготовила студентка гр. 430-2 Лузинсан А.А.</a:t>
             </a:r>
           </a:p>
@@ -7439,12 +7479,52 @@
               <a:buNone/>
             </a:pPr>
             <a:r>
-              <a:rPr lang="ru-RU" sz="2200" b="0" i="0" dirty="0"/>
+              <a:rPr lang="ru-RU" sz="2200" b="0" i="0" dirty="0">
+                <a:solidFill>
+                  <a:schemeClr val="bg1"/>
+                </a:solidFill>
+              </a:rPr>
               <a:t>Руководитель: доцент каф. АСУ, к.т.н. Сибилёв В.Д.</a:t>
             </a:r>
           </a:p>
         </p:txBody>
       </p:sp>
+      <p:cxnSp>
+        <p:nvCxnSpPr>
+          <p:cNvPr id="9" name="Прямая соединительная линия 8">
+            <a:extLst>
+              <a:ext uri="{FF2B5EF4-FFF2-40B4-BE49-F238E27FC236}">
+                <a16:creationId xmlns:a16="http://schemas.microsoft.com/office/drawing/2014/main" id="{83237BD6-D305-4597-B4A8-2FDE5F9AB024}"/>
+              </a:ext>
+            </a:extLst>
+          </p:cNvPr>
+          <p:cNvCxnSpPr/>
+          <p:nvPr/>
+        </p:nvCxnSpPr>
+        <p:spPr>
+          <a:xfrm>
+            <a:off x="6182139" y="4853014"/>
+            <a:ext cx="5317435" cy="0"/>
+          </a:xfrm>
+          <a:prstGeom prst="line">
+            <a:avLst/>
+          </a:prstGeom>
+        </p:spPr>
+        <p:style>
+          <a:lnRef idx="1">
+            <a:schemeClr val="accent1"/>
+          </a:lnRef>
+          <a:fillRef idx="0">
+            <a:schemeClr val="accent1"/>
+          </a:fillRef>
+          <a:effectRef idx="0">
+            <a:schemeClr val="accent1"/>
+          </a:effectRef>
+          <a:fontRef idx="minor">
+            <a:schemeClr val="tx1"/>
+          </a:fontRef>
+        </p:style>
+      </p:cxnSp>
     </p:spTree>
     <p:extLst>
       <p:ext uri="{BB962C8B-B14F-4D97-AF65-F5344CB8AC3E}">
@@ -7473,6 +7553,20 @@
 <file path=ppt/slides/slide2.xml><?xml version="1.0" encoding="utf-8"?>
 <p:sld xmlns:a="http://schemas.openxmlformats.org/drawingml/2006/main" xmlns:r="http://schemas.openxmlformats.org/officeDocument/2006/relationships" xmlns:p="http://schemas.openxmlformats.org/presentationml/2006/main">
   <p:cSld>
+    <p:bg>
+      <p:bgPr>
+        <a:blipFill dpi="0" rotWithShape="1">
+          <a:blip r:embed="rId3">
+            <a:lum/>
+          </a:blip>
+          <a:srcRect/>
+          <a:stretch>
+            <a:fillRect/>
+          </a:stretch>
+        </a:blipFill>
+        <a:effectLst/>
+      </p:bgPr>
+    </p:bg>
     <p:spTree>
       <p:nvGrpSpPr>
         <p:cNvPr id="1" name=""/>
@@ -7487,6 +7581,42 @@
           <a:chExt cx="0" cy="0"/>
         </a:xfrm>
       </p:grpSpPr>
+      <p:pic>
+        <p:nvPicPr>
+          <p:cNvPr id="5" name="Рисунок 4">
+            <a:extLst>
+              <a:ext uri="{FF2B5EF4-FFF2-40B4-BE49-F238E27FC236}">
+                <a16:creationId xmlns:a16="http://schemas.microsoft.com/office/drawing/2014/main" id="{A97B8425-1310-4FB0-A818-B954588F4ED6}"/>
+              </a:ext>
+            </a:extLst>
+          </p:cNvPr>
+          <p:cNvPicPr>
+            <a:picLocks noChangeAspect="1"/>
+          </p:cNvPicPr>
+          <p:nvPr/>
+        </p:nvPicPr>
+        <p:blipFill>
+          <a:blip r:embed="rId3">
+            <a:extLst>
+              <a:ext uri="{28A0092B-C50C-407E-A947-70E740481C1C}">
+                <a14:useLocalDpi xmlns:a14="http://schemas.microsoft.com/office/drawing/2010/main" val="0"/>
+              </a:ext>
+            </a:extLst>
+          </a:blip>
+          <a:stretch>
+            <a:fillRect/>
+          </a:stretch>
+        </p:blipFill>
+        <p:spPr>
+          <a:xfrm>
+            <a:off x="0" y="0"/>
+            <a:ext cx="12192000" cy="6858000"/>
+          </a:xfrm>
+          <a:prstGeom prst="rect">
+            <a:avLst/>
+          </a:prstGeom>
+        </p:spPr>
+      </p:pic>
       <p:sp>
         <p:nvSpPr>
           <p:cNvPr id="2" name="Заголовок 1"/>
@@ -7514,7 +7644,7 @@
             <a:r>
               <a:rPr lang="ru-RU" sz="3200" b="1" i="0" dirty="0">
                 <a:solidFill>
-                  <a:schemeClr val="tx1"/>
+                  <a:schemeClr val="bg1"/>
                 </a:solidFill>
                 <a:latin typeface="Garamond"/>
                 <a:ea typeface="+mj-ea"/>
@@ -7726,6 +7856,9 @@
             </a:pPr>
             <a:r>
               <a:rPr lang="ru-RU" sz="2400" dirty="0">
+                <a:solidFill>
+                  <a:schemeClr val="bg1"/>
+                </a:solidFill>
                 <a:latin typeface="Calibri"/>
               </a:rPr>
               <a:t>Пользователь участвует в формировании:</a:t>
@@ -7741,6 +7874,9 @@
             </a:pPr>
             <a:r>
               <a:rPr lang="ru-RU" sz="2400" dirty="0">
+                <a:solidFill>
+                  <a:schemeClr val="bg1"/>
+                </a:solidFill>
                 <a:latin typeface="Calibri"/>
               </a:rPr>
               <a:t>Состава коллектива.</a:t>
@@ -7756,6 +7892,9 @@
             </a:pPr>
             <a:r>
               <a:rPr lang="ru-RU" sz="2400" dirty="0">
+                <a:solidFill>
+                  <a:schemeClr val="bg1"/>
+                </a:solidFill>
                 <a:latin typeface="Calibri"/>
               </a:rPr>
               <a:t>Музыкального ансамбля.</a:t>
@@ -7771,6 +7910,9 @@
             </a:pPr>
             <a:r>
               <a:rPr lang="ru-RU" sz="2400" dirty="0">
+                <a:solidFill>
+                  <a:schemeClr val="bg1"/>
+                </a:solidFill>
                 <a:latin typeface="Calibri"/>
               </a:rPr>
               <a:t> Музыкальной секции.</a:t>
@@ -7786,6 +7928,9 @@
             </a:pPr>
             <a:r>
               <a:rPr lang="ru-RU" sz="2400" dirty="0">
+                <a:solidFill>
+                  <a:schemeClr val="bg1"/>
+                </a:solidFill>
                 <a:latin typeface="Calibri"/>
               </a:rPr>
               <a:t>Репертуара коллектива.</a:t>
@@ -7801,6 +7946,9 @@
             </a:pPr>
             <a:r>
               <a:rPr lang="ru-RU" sz="2400" dirty="0">
+                <a:solidFill>
+                  <a:schemeClr val="bg1"/>
+                </a:solidFill>
                 <a:latin typeface="Calibri"/>
               </a:rPr>
               <a:t>Состава музыкальных инструментов.</a:t>
@@ -7816,6 +7964,9 @@
             </a:pPr>
             <a:r>
               <a:rPr lang="ru-RU" sz="2400" dirty="0">
+                <a:solidFill>
+                  <a:schemeClr val="bg1"/>
+                </a:solidFill>
                 <a:latin typeface="Calibri"/>
               </a:rPr>
               <a:t>Расписания репетиций музыкальных секций.</a:t>
@@ -7831,6 +7982,9 @@
             </a:pPr>
             <a:r>
               <a:rPr lang="ru-RU" sz="2400" dirty="0">
+                <a:solidFill>
+                  <a:schemeClr val="bg1"/>
+                </a:solidFill>
                 <a:latin typeface="Calibri"/>
               </a:rPr>
               <a:t>Перечня мероприятий музыкальных ансамблей.</a:t>
@@ -7846,6 +8000,9 @@
             </a:pPr>
             <a:r>
               <a:rPr lang="ru-RU" sz="2400" dirty="0">
+                <a:solidFill>
+                  <a:schemeClr val="bg1"/>
+                </a:solidFill>
                 <a:latin typeface="Calibri"/>
               </a:rPr>
               <a:t>Перечня выступлений музыкальных ансамблей.</a:t>
@@ -7924,6 +8081,42 @@
           <a:chExt cx="0" cy="0"/>
         </a:xfrm>
       </p:grpSpPr>
+      <p:pic>
+        <p:nvPicPr>
+          <p:cNvPr id="5" name="Рисунок 4">
+            <a:extLst>
+              <a:ext uri="{FF2B5EF4-FFF2-40B4-BE49-F238E27FC236}">
+                <a16:creationId xmlns:a16="http://schemas.microsoft.com/office/drawing/2014/main" id="{0405F037-3EA2-473E-82E8-B6A79937A8FD}"/>
+              </a:ext>
+            </a:extLst>
+          </p:cNvPr>
+          <p:cNvPicPr>
+            <a:picLocks noChangeAspect="1"/>
+          </p:cNvPicPr>
+          <p:nvPr/>
+        </p:nvPicPr>
+        <p:blipFill>
+          <a:blip r:embed="rId3">
+            <a:extLst>
+              <a:ext uri="{28A0092B-C50C-407E-A947-70E740481C1C}">
+                <a14:useLocalDpi xmlns:a14="http://schemas.microsoft.com/office/drawing/2010/main" val="0"/>
+              </a:ext>
+            </a:extLst>
+          </a:blip>
+          <a:stretch>
+            <a:fillRect/>
+          </a:stretch>
+        </p:blipFill>
+        <p:spPr>
+          <a:xfrm>
+            <a:off x="0" y="0"/>
+            <a:ext cx="12192000" cy="6858000"/>
+          </a:xfrm>
+          <a:prstGeom prst="rect">
+            <a:avLst/>
+          </a:prstGeom>
+        </p:spPr>
+      </p:pic>
       <p:sp>
         <p:nvSpPr>
           <p:cNvPr id="2" name="Заголовок 1"/>
@@ -7951,7 +8144,7 @@
             <a:r>
               <a:rPr lang="ru-RU" sz="3200" b="1" i="0" dirty="0">
                 <a:solidFill>
-                  <a:schemeClr val="tx1"/>
+                  <a:schemeClr val="bg1"/>
                 </a:solidFill>
                 <a:latin typeface="Garamond"/>
                 <a:ea typeface="+mj-ea"/>
@@ -8162,7 +8355,11 @@
               <a:buChar char="•"/>
             </a:pPr>
             <a:r>
-              <a:rPr lang="ru-RU" dirty="0"/>
+              <a:rPr lang="ru-RU" dirty="0">
+                <a:solidFill>
+                  <a:schemeClr val="bg1"/>
+                </a:solidFill>
+              </a:rPr>
               <a:t>Цель проекта: автоматизация учёта и обработки информации, связанной с управлением студенческим музыкальным коллективом. </a:t>
             </a:r>
           </a:p>
@@ -8175,7 +8372,11 @@
               <a:buChar char="•"/>
             </a:pPr>
             <a:r>
-              <a:rPr lang="ru-RU" dirty="0"/>
+              <a:rPr lang="ru-RU" dirty="0">
+                <a:solidFill>
+                  <a:schemeClr val="bg1"/>
+                </a:solidFill>
+              </a:rPr>
               <a:t>Точка зрения модели: художественный руководитель студенческого музыкального коллектива.</a:t>
             </a:r>
           </a:p>
@@ -8189,6 +8390,9 @@
             </a:pPr>
             <a:r>
               <a:rPr lang="ru-RU" dirty="0">
+                <a:solidFill>
+                  <a:schemeClr val="bg1"/>
+                </a:solidFill>
                 <a:latin typeface="Calibri"/>
               </a:rPr>
               <a:t>Функции пользователя:</a:t>
@@ -8203,7 +8407,11 @@
               <a:buChar char="•"/>
             </a:pPr>
             <a:r>
-              <a:rPr lang="ru-RU" dirty="0"/>
+              <a:rPr lang="ru-RU" dirty="0">
+                <a:solidFill>
+                  <a:schemeClr val="bg1"/>
+                </a:solidFill>
+              </a:rPr>
               <a:t>Регистрация участника коллектива</a:t>
             </a:r>
           </a:p>
@@ -8216,7 +8424,11 @@
               <a:buChar char="•"/>
             </a:pPr>
             <a:r>
-              <a:rPr lang="ru-RU" dirty="0"/>
+              <a:rPr lang="ru-RU" dirty="0">
+                <a:solidFill>
+                  <a:schemeClr val="bg1"/>
+                </a:solidFill>
+              </a:rPr>
               <a:t>Регистрация музыкального инструмента</a:t>
             </a:r>
           </a:p>
@@ -8229,7 +8441,11 @@
               <a:buChar char="•"/>
             </a:pPr>
             <a:r>
-              <a:rPr lang="ru-RU" dirty="0"/>
+              <a:rPr lang="ru-RU" dirty="0">
+                <a:solidFill>
+                  <a:schemeClr val="bg1"/>
+                </a:solidFill>
+              </a:rPr>
               <a:t>Включение музыкального произведения в репертуар</a:t>
             </a:r>
           </a:p>
@@ -8242,7 +8458,11 @@
               <a:buChar char="•"/>
             </a:pPr>
             <a:r>
-              <a:rPr lang="ru-RU" dirty="0"/>
+              <a:rPr lang="ru-RU" dirty="0">
+                <a:solidFill>
+                  <a:schemeClr val="bg1"/>
+                </a:solidFill>
+              </a:rPr>
               <a:t>Формирование аранжировок музыкального произведения</a:t>
             </a:r>
           </a:p>
@@ -8255,7 +8475,11 @@
               <a:buChar char="•"/>
             </a:pPr>
             <a:r>
-              <a:rPr lang="ru-RU" dirty="0"/>
+              <a:rPr lang="ru-RU" dirty="0">
+                <a:solidFill>
+                  <a:schemeClr val="bg1"/>
+                </a:solidFill>
+              </a:rPr>
               <a:t>Формирование музыкального ансамбля</a:t>
             </a:r>
           </a:p>
@@ -8268,7 +8492,11 @@
               <a:buChar char="•"/>
             </a:pPr>
             <a:r>
-              <a:rPr lang="ru-RU" dirty="0"/>
+              <a:rPr lang="ru-RU" dirty="0">
+                <a:solidFill>
+                  <a:schemeClr val="bg1"/>
+                </a:solidFill>
+              </a:rPr>
               <a:t>Формирование музыкальной секции</a:t>
             </a:r>
           </a:p>
@@ -8281,7 +8509,11 @@
               <a:buChar char="•"/>
             </a:pPr>
             <a:r>
-              <a:rPr lang="ru-RU" dirty="0"/>
+              <a:rPr lang="ru-RU" dirty="0">
+                <a:solidFill>
+                  <a:schemeClr val="bg1"/>
+                </a:solidFill>
+              </a:rPr>
               <a:t>Включение мероприятия в перечень событий </a:t>
             </a:r>
           </a:p>
@@ -8294,7 +8526,11 @@
               <a:buChar char="•"/>
             </a:pPr>
             <a:r>
-              <a:rPr lang="ru-RU" dirty="0"/>
+              <a:rPr lang="ru-RU" dirty="0">
+                <a:solidFill>
+                  <a:schemeClr val="bg1"/>
+                </a:solidFill>
+              </a:rPr>
               <a:t>Генерация отчёта о работе коллектива</a:t>
             </a:r>
           </a:p>
@@ -8307,7 +8543,11 @@
               <a:buChar char="•"/>
             </a:pPr>
             <a:r>
-              <a:rPr lang="ru-RU" dirty="0"/>
+              <a:rPr lang="ru-RU" dirty="0">
+                <a:solidFill>
+                  <a:schemeClr val="bg1"/>
+                </a:solidFill>
+              </a:rPr>
               <a:t>Генерация характеристики-представления </a:t>
             </a:r>
           </a:p>
@@ -8320,6 +8560,9 @@
               <a:buChar char="•"/>
             </a:pPr>
             <a:endParaRPr lang="ru-RU" dirty="0">
+              <a:solidFill>
+                <a:schemeClr val="bg1"/>
+              </a:solidFill>
               <a:latin typeface="Calibri"/>
             </a:endParaRPr>
           </a:p>
@@ -8364,13 +8607,13 @@
   <p:clrMapOvr>
     <a:masterClrMapping/>
   </p:clrMapOvr>
-  <mc:AlternateContent xmlns:mc="http://schemas.openxmlformats.org/markup-compatibility/2006">
-    <mc:Choice xmlns:p14="http://schemas.microsoft.com/office/powerpoint/2010/main" Requires="p14">
+  <mc:AlternateContent xmlns:mc="http://schemas.openxmlformats.org/markup-compatibility/2006" xmlns:p14="http://schemas.microsoft.com/office/powerpoint/2010/main">
+    <mc:Choice Requires="p14">
       <p:transition spd="med" p14:dur="700">
         <p:fade/>
       </p:transition>
     </mc:Choice>
-    <mc:Fallback>
+    <mc:Fallback xmlns="">
       <p:transition spd="med">
         <p:fade/>
       </p:transition>
@@ -8396,6 +8639,42 @@
           <a:chExt cx="0" cy="0"/>
         </a:xfrm>
       </p:grpSpPr>
+      <p:pic>
+        <p:nvPicPr>
+          <p:cNvPr id="6" name="Рисунок 5">
+            <a:extLst>
+              <a:ext uri="{FF2B5EF4-FFF2-40B4-BE49-F238E27FC236}">
+                <a16:creationId xmlns:a16="http://schemas.microsoft.com/office/drawing/2014/main" id="{B566A674-A7C2-4088-BA91-74C5847B5DB4}"/>
+              </a:ext>
+            </a:extLst>
+          </p:cNvPr>
+          <p:cNvPicPr>
+            <a:picLocks noChangeAspect="1"/>
+          </p:cNvPicPr>
+          <p:nvPr/>
+        </p:nvPicPr>
+        <p:blipFill>
+          <a:blip r:embed="rId3">
+            <a:extLst>
+              <a:ext uri="{28A0092B-C50C-407E-A947-70E740481C1C}">
+                <a14:useLocalDpi xmlns:a14="http://schemas.microsoft.com/office/drawing/2010/main" val="0"/>
+              </a:ext>
+            </a:extLst>
+          </a:blip>
+          <a:stretch>
+            <a:fillRect/>
+          </a:stretch>
+        </p:blipFill>
+        <p:spPr>
+          <a:xfrm>
+            <a:off x="0" y="0"/>
+            <a:ext cx="12192000" cy="6858000"/>
+          </a:xfrm>
+          <a:prstGeom prst="rect">
+            <a:avLst/>
+          </a:prstGeom>
+        </p:spPr>
+      </p:pic>
       <p:sp>
         <p:nvSpPr>
           <p:cNvPr id="2" name="Заголовок 1"/>
@@ -8426,12 +8705,16 @@
               <a:buNone/>
             </a:pPr>
             <a:r>
-              <a:rPr lang="ru-RU" dirty="0"/>
+              <a:rPr lang="ru-RU" dirty="0">
+                <a:solidFill>
+                  <a:schemeClr val="bg1"/>
+                </a:solidFill>
+              </a:rPr>
               <a:t>Объекты ПО</a:t>
             </a:r>
             <a:endParaRPr lang="ru-RU" sz="3200" b="1" i="0" dirty="0">
               <a:solidFill>
-                <a:schemeClr val="tx1"/>
+                <a:schemeClr val="bg1"/>
               </a:solidFill>
               <a:latin typeface="Garamond"/>
               <a:ea typeface="+mj-ea"/>
@@ -8484,7 +8767,7 @@
           <p:nvPr>
             <p:extLst>
               <p:ext uri="{D42A27DB-BD31-4B8C-83A1-F6EECF244321}">
-                <p14:modId xmlns:p14="http://schemas.microsoft.com/office/powerpoint/2010/main" val="1554073441"/>
+                <p14:modId xmlns:p14="http://schemas.microsoft.com/office/powerpoint/2010/main" val="3331537266"/>
               </p:ext>
             </p:extLst>
           </p:nvPr>
@@ -8523,7 +8806,11 @@
                     <a:p>
                       <a:pPr algn="ctr"/>
                       <a:r>
-                        <a:rPr lang="ru-RU" dirty="0"/>
+                        <a:rPr lang="ru-RU" dirty="0">
+                          <a:solidFill>
+                            <a:schemeClr val="bg1"/>
+                          </a:solidFill>
+                        </a:rPr>
                         <a:t>Сущность</a:t>
                       </a:r>
                     </a:p>
@@ -8537,7 +8824,11 @@
                     <a:p>
                       <a:pPr algn="ctr"/>
                       <a:r>
-                        <a:rPr lang="ru-RU" dirty="0"/>
+                        <a:rPr lang="ru-RU" dirty="0">
+                          <a:solidFill>
+                            <a:schemeClr val="bg1"/>
+                          </a:solidFill>
+                        </a:rPr>
                         <a:t>Определение смысла</a:t>
                       </a:r>
                     </a:p>
@@ -8557,7 +8848,11 @@
                     <a:lstStyle/>
                     <a:p>
                       <a:r>
-                        <a:rPr lang="ru-RU" dirty="0"/>
+                        <a:rPr lang="ru-RU" dirty="0">
+                          <a:solidFill>
+                            <a:schemeClr val="bg1"/>
+                          </a:solidFill>
+                        </a:rPr>
                         <a:t>Участник коллектива</a:t>
                       </a:r>
                     </a:p>
@@ -8570,7 +8865,11 @@
                     <a:lstStyle/>
                     <a:p>
                       <a:r>
-                        <a:rPr lang="ru-RU" dirty="0"/>
+                        <a:rPr lang="ru-RU" dirty="0">
+                          <a:solidFill>
+                            <a:schemeClr val="bg1"/>
+                          </a:solidFill>
+                        </a:rPr>
                         <a:t>Студент, вступивший в коллектив</a:t>
                       </a:r>
                     </a:p>
@@ -8590,7 +8889,11 @@
                     <a:lstStyle/>
                     <a:p>
                       <a:r>
-                        <a:rPr lang="ru-RU" dirty="0"/>
+                        <a:rPr lang="ru-RU" dirty="0">
+                          <a:solidFill>
+                            <a:schemeClr val="bg1"/>
+                          </a:solidFill>
+                        </a:rPr>
                         <a:t>Владелец музыкального инструмента</a:t>
                       </a:r>
                     </a:p>
@@ -8603,7 +8906,11 @@
                     <a:lstStyle/>
                     <a:p>
                       <a:r>
-                        <a:rPr lang="ru-RU" dirty="0"/>
+                        <a:rPr lang="ru-RU" dirty="0">
+                          <a:solidFill>
+                            <a:schemeClr val="bg1"/>
+                          </a:solidFill>
+                        </a:rPr>
                         <a:t>Участник коллектива, владеющий навыками игры на инструменте</a:t>
                       </a:r>
                     </a:p>
@@ -8623,7 +8930,11 @@
                     <a:lstStyle/>
                     <a:p>
                       <a:r>
-                        <a:rPr lang="ru-RU" dirty="0"/>
+                        <a:rPr lang="ru-RU" dirty="0">
+                          <a:solidFill>
+                            <a:schemeClr val="bg1"/>
+                          </a:solidFill>
+                        </a:rPr>
                         <a:t>Музыкальный инструмент</a:t>
                       </a:r>
                     </a:p>
@@ -8636,7 +8947,11 @@
                     <a:lstStyle/>
                     <a:p>
                       <a:r>
-                        <a:rPr lang="ru-RU" dirty="0"/>
+                        <a:rPr lang="ru-RU" dirty="0">
+                          <a:solidFill>
+                            <a:schemeClr val="bg1"/>
+                          </a:solidFill>
+                        </a:rPr>
                         <a:t>Набор сведений о музыкальном инструменте</a:t>
                       </a:r>
                     </a:p>
@@ -8656,7 +8971,11 @@
                     <a:lstStyle/>
                     <a:p>
                       <a:r>
-                        <a:rPr lang="ru-RU" dirty="0"/>
+                        <a:rPr lang="ru-RU" dirty="0">
+                          <a:solidFill>
+                            <a:schemeClr val="bg1"/>
+                          </a:solidFill>
+                        </a:rPr>
                         <a:t>Музыкальное произведение</a:t>
                       </a:r>
                     </a:p>
@@ -8669,7 +8988,11 @@
                     <a:lstStyle/>
                     <a:p>
                       <a:r>
-                        <a:rPr lang="ru-RU" dirty="0"/>
+                        <a:rPr lang="ru-RU" dirty="0">
+                          <a:solidFill>
+                            <a:schemeClr val="bg1"/>
+                          </a:solidFill>
+                        </a:rPr>
                         <a:t>Сведения о музыкальной композиции</a:t>
                       </a:r>
                     </a:p>
@@ -8689,7 +9012,11 @@
                     <a:lstStyle/>
                     <a:p>
                       <a:r>
-                        <a:rPr lang="ru-RU" dirty="0"/>
+                        <a:rPr lang="ru-RU" dirty="0">
+                          <a:solidFill>
+                            <a:schemeClr val="bg1"/>
+                          </a:solidFill>
+                        </a:rPr>
                         <a:t>Аранжировка</a:t>
                       </a:r>
                     </a:p>
@@ -8702,7 +9029,11 @@
                     <a:lstStyle/>
                     <a:p>
                       <a:r>
-                        <a:rPr lang="ru-RU" dirty="0"/>
+                        <a:rPr lang="ru-RU" dirty="0">
+                          <a:solidFill>
+                            <a:schemeClr val="bg1"/>
+                          </a:solidFill>
+                        </a:rPr>
                         <a:t>Адаптированная под коллектив версия музыкального произведения</a:t>
                       </a:r>
                     </a:p>
@@ -8722,7 +9053,11 @@
                     <a:lstStyle/>
                     <a:p>
                       <a:r>
-                        <a:rPr lang="ru-RU" dirty="0"/>
+                        <a:rPr lang="ru-RU" dirty="0">
+                          <a:solidFill>
+                            <a:schemeClr val="bg1"/>
+                          </a:solidFill>
+                        </a:rPr>
                         <a:t>Музыкальный ансамбль</a:t>
                       </a:r>
                     </a:p>
@@ -8735,7 +9070,11 @@
                     <a:lstStyle/>
                     <a:p>
                       <a:r>
-                        <a:rPr lang="ru-RU" dirty="0"/>
+                        <a:rPr lang="ru-RU" dirty="0">
+                          <a:solidFill>
+                            <a:schemeClr val="bg1"/>
+                          </a:solidFill>
+                        </a:rPr>
                         <a:t>Совокупность участников коллектива для выступлений на мероприятиях</a:t>
                       </a:r>
                     </a:p>
@@ -8755,7 +9094,11 @@
                     <a:lstStyle/>
                     <a:p>
                       <a:r>
-                        <a:rPr lang="ru-RU" dirty="0"/>
+                        <a:rPr lang="ru-RU" dirty="0">
+                          <a:solidFill>
+                            <a:schemeClr val="bg1"/>
+                          </a:solidFill>
+                        </a:rPr>
                         <a:t>Участник музыкального ансамбля</a:t>
                       </a:r>
                     </a:p>
@@ -8768,7 +9111,11 @@
                     <a:lstStyle/>
                     <a:p>
                       <a:r>
-                        <a:rPr lang="ru-RU" dirty="0"/>
+                        <a:rPr lang="ru-RU" dirty="0">
+                          <a:solidFill>
+                            <a:schemeClr val="bg1"/>
+                          </a:solidFill>
+                        </a:rPr>
                         <a:t>Участник коллектива, состоящий в конкретном музыкальном ансамбле</a:t>
                       </a:r>
                     </a:p>
@@ -8788,7 +9135,11 @@
                     <a:lstStyle/>
                     <a:p>
                       <a:r>
-                        <a:rPr lang="ru-RU" dirty="0"/>
+                        <a:rPr lang="ru-RU" dirty="0">
+                          <a:solidFill>
+                            <a:schemeClr val="bg1"/>
+                          </a:solidFill>
+                        </a:rPr>
                         <a:t>Музыкальная секция</a:t>
                       </a:r>
                     </a:p>
@@ -8818,7 +9169,11 @@
                         <a:defRPr/>
                       </a:pPr>
                       <a:r>
-                        <a:rPr lang="ru-RU" dirty="0"/>
+                        <a:rPr lang="ru-RU" dirty="0">
+                          <a:solidFill>
+                            <a:schemeClr val="bg1"/>
+                          </a:solidFill>
+                        </a:rPr>
                         <a:t>Совокупность участников коллектива для посещения репетиций</a:t>
                       </a:r>
                     </a:p>
@@ -8838,7 +9193,11 @@
                     <a:lstStyle/>
                     <a:p>
                       <a:r>
-                        <a:rPr lang="ru-RU" dirty="0"/>
+                        <a:rPr lang="ru-RU" dirty="0">
+                          <a:solidFill>
+                            <a:schemeClr val="bg1"/>
+                          </a:solidFill>
+                        </a:rPr>
                         <a:t>Участник музыкальной секции</a:t>
                       </a:r>
                     </a:p>
@@ -8868,7 +9227,11 @@
                         <a:defRPr/>
                       </a:pPr>
                       <a:r>
-                        <a:rPr lang="ru-RU" dirty="0"/>
+                        <a:rPr lang="ru-RU" dirty="0">
+                          <a:solidFill>
+                            <a:schemeClr val="bg1"/>
+                          </a:solidFill>
+                        </a:rPr>
                         <a:t>Участник коллектива, состоящий в конкретной музыкальной секции</a:t>
                       </a:r>
                     </a:p>
@@ -8888,7 +9251,11 @@
                     <a:lstStyle/>
                     <a:p>
                       <a:r>
-                        <a:rPr lang="ru-RU" dirty="0"/>
+                        <a:rPr lang="ru-RU" dirty="0">
+                          <a:solidFill>
+                            <a:schemeClr val="bg1"/>
+                          </a:solidFill>
+                        </a:rPr>
                         <a:t>Репетиция</a:t>
                       </a:r>
                     </a:p>
@@ -8901,7 +9268,11 @@
                     <a:lstStyle/>
                     <a:p>
                       <a:r>
-                        <a:rPr lang="ru-RU" dirty="0"/>
+                        <a:rPr lang="ru-RU" dirty="0">
+                          <a:solidFill>
+                            <a:schemeClr val="bg1"/>
+                          </a:solidFill>
+                        </a:rPr>
                         <a:t>Временной промежуток для проведения занятий музыкальных секций</a:t>
                       </a:r>
                     </a:p>
@@ -8921,7 +9292,11 @@
                     <a:lstStyle/>
                     <a:p>
                       <a:r>
-                        <a:rPr lang="ru-RU" dirty="0"/>
+                        <a:rPr lang="ru-RU" dirty="0">
+                          <a:solidFill>
+                            <a:schemeClr val="bg1"/>
+                          </a:solidFill>
+                        </a:rPr>
                         <a:t>Занятие музыкальной секции</a:t>
                       </a:r>
                     </a:p>
@@ -8934,7 +9309,11 @@
                     <a:lstStyle/>
                     <a:p>
                       <a:r>
-                        <a:rPr lang="ru-RU" dirty="0"/>
+                        <a:rPr lang="ru-RU" dirty="0">
+                          <a:solidFill>
+                            <a:schemeClr val="bg1"/>
+                          </a:solidFill>
+                        </a:rPr>
                         <a:t>Репетиция конкретной музыкальной секции</a:t>
                       </a:r>
                     </a:p>
@@ -8954,7 +9333,11 @@
                     <a:lstStyle/>
                     <a:p>
                       <a:r>
-                        <a:rPr lang="ru-RU" dirty="0"/>
+                        <a:rPr lang="ru-RU" dirty="0">
+                          <a:solidFill>
+                            <a:schemeClr val="bg1"/>
+                          </a:solidFill>
+                        </a:rPr>
                         <a:t>Мероприятие</a:t>
                       </a:r>
                     </a:p>
@@ -8967,7 +9350,11 @@
                     <a:lstStyle/>
                     <a:p>
                       <a:r>
-                        <a:rPr lang="ru-RU" dirty="0"/>
+                        <a:rPr lang="ru-RU" dirty="0">
+                          <a:solidFill>
+                            <a:schemeClr val="bg1"/>
+                          </a:solidFill>
+                        </a:rPr>
                         <a:t>Набор сведений о творческом событии</a:t>
                       </a:r>
                     </a:p>
@@ -8987,7 +9374,11 @@
                     <a:lstStyle/>
                     <a:p>
                       <a:r>
-                        <a:rPr lang="ru-RU" dirty="0"/>
+                        <a:rPr lang="ru-RU" dirty="0">
+                          <a:solidFill>
+                            <a:schemeClr val="bg1"/>
+                          </a:solidFill>
+                        </a:rPr>
                         <a:t>Выступление</a:t>
                       </a:r>
                     </a:p>
@@ -9000,7 +9391,11 @@
                     <a:lstStyle/>
                     <a:p>
                       <a:r>
-                        <a:rPr lang="ru-RU" dirty="0"/>
+                        <a:rPr lang="ru-RU" dirty="0">
+                          <a:solidFill>
+                            <a:schemeClr val="bg1"/>
+                          </a:solidFill>
+                        </a:rPr>
                         <a:t>Творческий номер музыкального ансамбля на мероприятии</a:t>
                       </a:r>
                     </a:p>
@@ -9059,6 +9454,42 @@
           <a:chExt cx="0" cy="0"/>
         </a:xfrm>
       </p:grpSpPr>
+      <p:pic>
+        <p:nvPicPr>
+          <p:cNvPr id="5" name="Рисунок 4">
+            <a:extLst>
+              <a:ext uri="{FF2B5EF4-FFF2-40B4-BE49-F238E27FC236}">
+                <a16:creationId xmlns:a16="http://schemas.microsoft.com/office/drawing/2014/main" id="{B3E61FBF-EBBB-4DC5-A396-0D9ECD86A267}"/>
+              </a:ext>
+            </a:extLst>
+          </p:cNvPr>
+          <p:cNvPicPr>
+            <a:picLocks noChangeAspect="1"/>
+          </p:cNvPicPr>
+          <p:nvPr/>
+        </p:nvPicPr>
+        <p:blipFill>
+          <a:blip r:embed="rId3">
+            <a:extLst>
+              <a:ext uri="{28A0092B-C50C-407E-A947-70E740481C1C}">
+                <a14:useLocalDpi xmlns:a14="http://schemas.microsoft.com/office/drawing/2010/main" val="0"/>
+              </a:ext>
+            </a:extLst>
+          </a:blip>
+          <a:stretch>
+            <a:fillRect/>
+          </a:stretch>
+        </p:blipFill>
+        <p:spPr>
+          <a:xfrm>
+            <a:off x="0" y="0"/>
+            <a:ext cx="12192000" cy="6858000"/>
+          </a:xfrm>
+          <a:prstGeom prst="rect">
+            <a:avLst/>
+          </a:prstGeom>
+        </p:spPr>
+      </p:pic>
       <p:sp>
         <p:nvSpPr>
           <p:cNvPr id="2" name="Заголовок 1"/>
@@ -9084,20 +9515,32 @@
               <a:buNone/>
             </a:pPr>
             <a:r>
-              <a:rPr lang="ru-RU" dirty="0"/>
+              <a:rPr lang="ru-RU" dirty="0">
+                <a:solidFill>
+                  <a:schemeClr val="bg1"/>
+                </a:solidFill>
+              </a:rPr>
               <a:t>Диаграмма </a:t>
             </a:r>
             <a:r>
-              <a:rPr lang="en-US" dirty="0"/>
+              <a:rPr lang="en-US" dirty="0">
+                <a:solidFill>
+                  <a:schemeClr val="bg1"/>
+                </a:solidFill>
+              </a:rPr>
               <a:t>ER-</a:t>
             </a:r>
             <a:r>
-              <a:rPr lang="ru-RU" dirty="0"/>
+              <a:rPr lang="ru-RU" dirty="0">
+                <a:solidFill>
+                  <a:schemeClr val="bg1"/>
+                </a:solidFill>
+              </a:rPr>
               <a:t>уровня </a:t>
             </a:r>
             <a:endParaRPr lang="ru-RU" sz="3200" b="1" i="0" dirty="0">
               <a:solidFill>
-                <a:schemeClr val="tx1"/>
+                <a:schemeClr val="bg1"/>
               </a:solidFill>
               <a:latin typeface="Garamond"/>
               <a:ea typeface="+mj-ea"/>
@@ -9150,7 +9593,7 @@
           <p:nvPr/>
         </p:nvPicPr>
         <p:blipFill>
-          <a:blip r:embed="rId3">
+          <a:blip r:embed="rId4">
             <a:extLst>
               <a:ext uri="{28A0092B-C50C-407E-A947-70E740481C1C}">
                 <a14:useLocalDpi xmlns:a14="http://schemas.microsoft.com/office/drawing/2010/main" val="0"/>
@@ -9213,6 +9656,42 @@
           <a:chExt cx="0" cy="0"/>
         </a:xfrm>
       </p:grpSpPr>
+      <p:pic>
+        <p:nvPicPr>
+          <p:cNvPr id="5" name="Рисунок 4">
+            <a:extLst>
+              <a:ext uri="{FF2B5EF4-FFF2-40B4-BE49-F238E27FC236}">
+                <a16:creationId xmlns:a16="http://schemas.microsoft.com/office/drawing/2014/main" id="{A24593F5-C97F-4F7A-8B71-24C1BA547EF4}"/>
+              </a:ext>
+            </a:extLst>
+          </p:cNvPr>
+          <p:cNvPicPr>
+            <a:picLocks noChangeAspect="1"/>
+          </p:cNvPicPr>
+          <p:nvPr/>
+        </p:nvPicPr>
+        <p:blipFill>
+          <a:blip r:embed="rId3">
+            <a:extLst>
+              <a:ext uri="{28A0092B-C50C-407E-A947-70E740481C1C}">
+                <a14:useLocalDpi xmlns:a14="http://schemas.microsoft.com/office/drawing/2010/main" val="0"/>
+              </a:ext>
+            </a:extLst>
+          </a:blip>
+          <a:stretch>
+            <a:fillRect/>
+          </a:stretch>
+        </p:blipFill>
+        <p:spPr>
+          <a:xfrm>
+            <a:off x="0" y="0"/>
+            <a:ext cx="12192000" cy="6858000"/>
+          </a:xfrm>
+          <a:prstGeom prst="rect">
+            <a:avLst/>
+          </a:prstGeom>
+        </p:spPr>
+      </p:pic>
       <p:sp>
         <p:nvSpPr>
           <p:cNvPr id="2" name="Заголовок 1"/>
@@ -9238,20 +9717,32 @@
               <a:buNone/>
             </a:pPr>
             <a:r>
-              <a:rPr lang="ru-RU" dirty="0"/>
+              <a:rPr lang="ru-RU" dirty="0">
+                <a:solidFill>
+                  <a:schemeClr val="bg1"/>
+                </a:solidFill>
+              </a:rPr>
               <a:t>Диаграмма </a:t>
             </a:r>
             <a:r>
-              <a:rPr lang="en-US" dirty="0"/>
+              <a:rPr lang="en-US" dirty="0">
+                <a:solidFill>
+                  <a:schemeClr val="bg1"/>
+                </a:solidFill>
+              </a:rPr>
               <a:t>KB-</a:t>
             </a:r>
             <a:r>
-              <a:rPr lang="ru-RU" dirty="0"/>
+              <a:rPr lang="ru-RU" dirty="0">
+                <a:solidFill>
+                  <a:schemeClr val="bg1"/>
+                </a:solidFill>
+              </a:rPr>
               <a:t>уровня</a:t>
             </a:r>
             <a:endParaRPr lang="ru-RU" sz="3200" b="1" i="0" dirty="0">
               <a:solidFill>
-                <a:schemeClr val="tx1"/>
+                <a:schemeClr val="bg1"/>
               </a:solidFill>
               <a:latin typeface="Garamond"/>
               <a:ea typeface="+mj-ea"/>
@@ -9317,7 +9808,7 @@
           <p:nvPr/>
         </p:nvPicPr>
         <p:blipFill>
-          <a:blip r:embed="rId3"/>
+          <a:blip r:embed="rId4"/>
           <a:stretch>
             <a:fillRect/>
           </a:stretch>
@@ -9342,13 +9833,13 @@
   <p:clrMapOvr>
     <a:masterClrMapping/>
   </p:clrMapOvr>
-  <mc:AlternateContent xmlns:mc="http://schemas.openxmlformats.org/markup-compatibility/2006">
-    <mc:Choice xmlns:p14="http://schemas.microsoft.com/office/powerpoint/2010/main" Requires="p14">
+  <mc:AlternateContent xmlns:mc="http://schemas.openxmlformats.org/markup-compatibility/2006" xmlns:p14="http://schemas.microsoft.com/office/powerpoint/2010/main">
+    <mc:Choice Requires="p14">
       <p:transition spd="med" p14:dur="700">
         <p:fade/>
       </p:transition>
     </mc:Choice>
-    <mc:Fallback>
+    <mc:Fallback xmlns="">
       <p:transition spd="med">
         <p:fade/>
       </p:transition>
@@ -9376,6 +9867,42 @@
       </p:grpSpPr>
       <p:pic>
         <p:nvPicPr>
+          <p:cNvPr id="5" name="Рисунок 4">
+            <a:extLst>
+              <a:ext uri="{FF2B5EF4-FFF2-40B4-BE49-F238E27FC236}">
+                <a16:creationId xmlns:a16="http://schemas.microsoft.com/office/drawing/2014/main" id="{68D8513C-DC40-4CD6-A2C2-3BBD23650115}"/>
+              </a:ext>
+            </a:extLst>
+          </p:cNvPr>
+          <p:cNvPicPr>
+            <a:picLocks noChangeAspect="1"/>
+          </p:cNvPicPr>
+          <p:nvPr/>
+        </p:nvPicPr>
+        <p:blipFill>
+          <a:blip r:embed="rId3">
+            <a:extLst>
+              <a:ext uri="{28A0092B-C50C-407E-A947-70E740481C1C}">
+                <a14:useLocalDpi xmlns:a14="http://schemas.microsoft.com/office/drawing/2010/main" val="0"/>
+              </a:ext>
+            </a:extLst>
+          </a:blip>
+          <a:stretch>
+            <a:fillRect/>
+          </a:stretch>
+        </p:blipFill>
+        <p:spPr>
+          <a:xfrm>
+            <a:off x="0" y="0"/>
+            <a:ext cx="12192000" cy="6858000"/>
+          </a:xfrm>
+          <a:prstGeom prst="rect">
+            <a:avLst/>
+          </a:prstGeom>
+        </p:spPr>
+      </p:pic>
+      <p:pic>
+        <p:nvPicPr>
           <p:cNvPr id="7" name="Рисунок 6">
             <a:extLst>
               <a:ext uri="{FF2B5EF4-FFF2-40B4-BE49-F238E27FC236}">
@@ -9389,7 +9916,7 @@
           <p:nvPr/>
         </p:nvPicPr>
         <p:blipFill>
-          <a:blip r:embed="rId3">
+          <a:blip r:embed="rId4">
             <a:extLst>
               <a:ext uri="{28A0092B-C50C-407E-A947-70E740481C1C}">
                 <a14:useLocalDpi xmlns:a14="http://schemas.microsoft.com/office/drawing/2010/main" val="0"/>
@@ -9435,20 +9962,32 @@
               <a:buNone/>
             </a:pPr>
             <a:r>
-              <a:rPr lang="ru-RU" dirty="0"/>
+              <a:rPr lang="ru-RU" dirty="0">
+                <a:solidFill>
+                  <a:schemeClr val="bg1"/>
+                </a:solidFill>
+              </a:rPr>
               <a:t>Диаграмма </a:t>
             </a:r>
             <a:r>
-              <a:rPr lang="en-US" dirty="0"/>
+              <a:rPr lang="en-US" dirty="0">
+                <a:solidFill>
+                  <a:schemeClr val="bg1"/>
+                </a:solidFill>
+              </a:rPr>
               <a:t>FA-</a:t>
             </a:r>
             <a:r>
-              <a:rPr lang="ru-RU" dirty="0"/>
+              <a:rPr lang="ru-RU" dirty="0">
+                <a:solidFill>
+                  <a:schemeClr val="bg1"/>
+                </a:solidFill>
+              </a:rPr>
               <a:t>уровня</a:t>
             </a:r>
             <a:endParaRPr lang="ru-RU" sz="3200" b="1" i="0" dirty="0">
               <a:solidFill>
-                <a:schemeClr val="tx1"/>
+                <a:schemeClr val="bg1"/>
               </a:solidFill>
               <a:latin typeface="Garamond"/>
               <a:ea typeface="+mj-ea"/>
@@ -9541,6 +10080,42 @@
           <a:chExt cx="0" cy="0"/>
         </a:xfrm>
       </p:grpSpPr>
+      <p:pic>
+        <p:nvPicPr>
+          <p:cNvPr id="6" name="Рисунок 5">
+            <a:extLst>
+              <a:ext uri="{FF2B5EF4-FFF2-40B4-BE49-F238E27FC236}">
+                <a16:creationId xmlns:a16="http://schemas.microsoft.com/office/drawing/2014/main" id="{DA406A4F-C2BC-4D12-8446-908DABFCE005}"/>
+              </a:ext>
+            </a:extLst>
+          </p:cNvPr>
+          <p:cNvPicPr>
+            <a:picLocks noChangeAspect="1"/>
+          </p:cNvPicPr>
+          <p:nvPr/>
+        </p:nvPicPr>
+        <p:blipFill>
+          <a:blip r:embed="rId3">
+            <a:extLst>
+              <a:ext uri="{28A0092B-C50C-407E-A947-70E740481C1C}">
+                <a14:useLocalDpi xmlns:a14="http://schemas.microsoft.com/office/drawing/2010/main" val="0"/>
+              </a:ext>
+            </a:extLst>
+          </a:blip>
+          <a:stretch>
+            <a:fillRect/>
+          </a:stretch>
+        </p:blipFill>
+        <p:spPr>
+          <a:xfrm>
+            <a:off x="0" y="0"/>
+            <a:ext cx="12192000" cy="6858000"/>
+          </a:xfrm>
+          <a:prstGeom prst="rect">
+            <a:avLst/>
+          </a:prstGeom>
+        </p:spPr>
+      </p:pic>
       <p:sp>
         <p:nvSpPr>
           <p:cNvPr id="2" name="Заголовок 1"/>
@@ -9557,7 +10132,11 @@
           <a:lstStyle/>
           <a:p>
             <a:r>
-              <a:rPr lang="ru-RU" dirty="0"/>
+              <a:rPr lang="ru-RU" dirty="0">
+                <a:solidFill>
+                  <a:schemeClr val="bg1"/>
+                </a:solidFill>
+              </a:rPr>
               <a:t>ЗАКЛЮЧЕНИЕ</a:t>
             </a:r>
           </a:p>
@@ -9754,76 +10333,136 @@
           </a:lstStyle>
           <a:p>
             <a:r>
-              <a:rPr lang="ru-RU" dirty="0"/>
+              <a:rPr lang="ru-RU" dirty="0">
+                <a:solidFill>
+                  <a:schemeClr val="bg1"/>
+                </a:solidFill>
+              </a:rPr>
               <a:t>Проанализирована предметная область;</a:t>
             </a:r>
           </a:p>
           <a:p>
             <a:r>
-              <a:rPr lang="ru-RU" dirty="0"/>
+              <a:rPr lang="ru-RU" dirty="0">
+                <a:solidFill>
+                  <a:schemeClr val="bg1"/>
+                </a:solidFill>
+              </a:rPr>
               <a:t>Выявлен предполагаемый пользователь;</a:t>
             </a:r>
           </a:p>
           <a:p>
             <a:r>
-              <a:rPr lang="ru-RU" dirty="0"/>
+              <a:rPr lang="ru-RU" dirty="0">
+                <a:solidFill>
+                  <a:schemeClr val="bg1"/>
+                </a:solidFill>
+              </a:rPr>
               <a:t>Выявлены функции пользователя;</a:t>
             </a:r>
           </a:p>
           <a:p>
             <a:r>
-              <a:rPr lang="ru-RU" dirty="0"/>
+              <a:rPr lang="ru-RU" dirty="0">
+                <a:solidFill>
+                  <a:schemeClr val="bg1"/>
+                </a:solidFill>
+              </a:rPr>
               <a:t>Определены бизнес-правила;</a:t>
             </a:r>
           </a:p>
           <a:p>
             <a:r>
-              <a:rPr lang="ru-RU" dirty="0"/>
+              <a:rPr lang="ru-RU" dirty="0">
+                <a:solidFill>
+                  <a:schemeClr val="bg1"/>
+                </a:solidFill>
+              </a:rPr>
               <a:t>Собрана и проанализирована информация и входных и выходных документах и сообщениях;</a:t>
             </a:r>
           </a:p>
           <a:p>
             <a:r>
-              <a:rPr lang="ru-RU" dirty="0"/>
+              <a:rPr lang="ru-RU" dirty="0">
+                <a:solidFill>
+                  <a:schemeClr val="bg1"/>
+                </a:solidFill>
+              </a:rPr>
               <a:t>Определены объекты ПО и связи между ними;</a:t>
             </a:r>
           </a:p>
           <a:p>
             <a:r>
-              <a:rPr lang="ru-RU" dirty="0"/>
+              <a:rPr lang="ru-RU" dirty="0">
+                <a:solidFill>
+                  <a:schemeClr val="bg1"/>
+                </a:solidFill>
+              </a:rPr>
               <a:t>Спроектированы диаграммы </a:t>
             </a:r>
             <a:r>
-              <a:rPr lang="en-US" dirty="0"/>
+              <a:rPr lang="en-US" dirty="0">
+                <a:solidFill>
+                  <a:schemeClr val="bg1"/>
+                </a:solidFill>
+              </a:rPr>
               <a:t>ER, KB </a:t>
             </a:r>
             <a:r>
-              <a:rPr lang="ru-RU" dirty="0"/>
+              <a:rPr lang="ru-RU" dirty="0">
+                <a:solidFill>
+                  <a:schemeClr val="bg1"/>
+                </a:solidFill>
+              </a:rPr>
               <a:t>и </a:t>
             </a:r>
             <a:r>
-              <a:rPr lang="en-US" dirty="0"/>
+              <a:rPr lang="en-US" dirty="0">
+                <a:solidFill>
+                  <a:schemeClr val="bg1"/>
+                </a:solidFill>
+              </a:rPr>
               <a:t>FA </a:t>
             </a:r>
             <a:r>
-              <a:rPr lang="ru-RU" dirty="0"/>
+              <a:rPr lang="ru-RU" dirty="0">
+                <a:solidFill>
+                  <a:schemeClr val="bg1"/>
+                </a:solidFill>
+              </a:rPr>
               <a:t>уровней;</a:t>
             </a:r>
           </a:p>
           <a:p>
             <a:r>
-              <a:rPr lang="ru-RU" dirty="0"/>
+              <a:rPr lang="ru-RU" dirty="0">
+                <a:solidFill>
+                  <a:schemeClr val="bg1"/>
+                </a:solidFill>
+              </a:rPr>
               <a:t>Создана модель данных пользователя.</a:t>
             </a:r>
           </a:p>
           <a:p>
-            <a:endParaRPr lang="ru-RU" dirty="0"/>
-          </a:p>
-          <a:p>
-            <a:endParaRPr lang="ru-RU" dirty="0"/>
-          </a:p>
-          <a:p>
-            <a:endParaRPr lang="ru-RU" dirty="0"/>
+            <a:endParaRPr lang="ru-RU" dirty="0">
+              <a:solidFill>
+                <a:schemeClr val="bg1"/>
+              </a:solidFill>
+            </a:endParaRPr>
+          </a:p>
+          <a:p>
+            <a:endParaRPr lang="ru-RU" dirty="0">
+              <a:solidFill>
+                <a:schemeClr val="bg1"/>
+              </a:solidFill>
+            </a:endParaRPr>
+          </a:p>
+          <a:p>
+            <a:endParaRPr lang="ru-RU" dirty="0">
+              <a:solidFill>
+                <a:schemeClr val="bg1"/>
+              </a:solidFill>
+            </a:endParaRPr>
           </a:p>
         </p:txBody>
       </p:sp>
@@ -10485,134 +11124,6 @@
 </file>
 
 <file path=customXml/item1.xml><?xml version="1.0" encoding="utf-8"?>
-<p:properties xmlns:p="http://schemas.microsoft.com/office/2006/metadata/properties" xmlns:xsi="http://www.w3.org/2001/XMLSchema-instance" xmlns:pc="http://schemas.microsoft.com/office/infopath/2007/PartnerControls">
-  <documentManagement>
-    <DirectSourceMarket xmlns="9d035d7d-02e5-4a00-8b62-9a556aabc7b5">english</DirectSourceMarket>
-    <AssetId xmlns="9d035d7d-02e5-4a00-8b62-9a556aabc7b5">TP103896547</AssetId>
-    <TPFriendlyName xmlns="9d035d7d-02e5-4a00-8b62-9a556aabc7b5" xsi:nil="true"/>
-    <SourceTitle xmlns="9d035d7d-02e5-4a00-8b62-9a556aabc7b5" xsi:nil="true"/>
-    <TPApplication xmlns="9d035d7d-02e5-4a00-8b62-9a556aabc7b5" xsi:nil="true"/>
-    <TPLaunchHelpLink xmlns="9d035d7d-02e5-4a00-8b62-9a556aabc7b5" xsi:nil="true"/>
-    <OpenTemplate xmlns="9d035d7d-02e5-4a00-8b62-9a556aabc7b5">true</OpenTemplate>
-    <CrawlForDependencies xmlns="9d035d7d-02e5-4a00-8b62-9a556aabc7b5">false</CrawlForDependencies>
-    <TrustLevel xmlns="9d035d7d-02e5-4a00-8b62-9a556aabc7b5">1 Microsoft Managed Content</TrustLevel>
-    <FeatureTagsTaxHTField0 xmlns="9d035d7d-02e5-4a00-8b62-9a556aabc7b5">
-      <Terms xmlns="http://schemas.microsoft.com/office/infopath/2007/PartnerControls"/>
-    </FeatureTagsTaxHTField0>
-    <PublishStatusLookup xmlns="9d035d7d-02e5-4a00-8b62-9a556aabc7b5">
-      <Value>488331</Value>
-    </PublishStatusLookup>
-    <LocLastLocAttemptVersionLookup xmlns="9d035d7d-02e5-4a00-8b62-9a556aabc7b5" xsi:nil="true"/>
-    <CampaignTagsTaxHTField0 xmlns="9d035d7d-02e5-4a00-8b62-9a556aabc7b5">
-      <Terms xmlns="http://schemas.microsoft.com/office/infopath/2007/PartnerControls"/>
-    </CampaignTagsTaxHTField0>
-    <IsSearchable xmlns="9d035d7d-02e5-4a00-8b62-9a556aabc7b5">true</IsSearchable>
-    <TPNamespace xmlns="9d035d7d-02e5-4a00-8b62-9a556aabc7b5" xsi:nil="true"/>
-    <TemplateTemplateType xmlns="9d035d7d-02e5-4a00-8b62-9a556aabc7b5">PowerPoint Presentation Template</TemplateTemplateType>
-    <Markets xmlns="9d035d7d-02e5-4a00-8b62-9a556aabc7b5"/>
-    <OriginalSourceMarket xmlns="9d035d7d-02e5-4a00-8b62-9a556aabc7b5">english</OriginalSourceMarket>
-    <TPInstallLocation xmlns="9d035d7d-02e5-4a00-8b62-9a556aabc7b5" xsi:nil="true"/>
-    <LocMarketGroupTiers2 xmlns="9d035d7d-02e5-4a00-8b62-9a556aabc7b5" xsi:nil="true"/>
-    <TPAppVersion xmlns="9d035d7d-02e5-4a00-8b62-9a556aabc7b5" xsi:nil="true"/>
-    <TPCommandLine xmlns="9d035d7d-02e5-4a00-8b62-9a556aabc7b5" xsi:nil="true"/>
-    <APAuthor xmlns="9d035d7d-02e5-4a00-8b62-9a556aabc7b5">
-      <UserInfo>
-        <DisplayName>System Account</DisplayName>
-        <AccountId>1073741823</AccountId>
-        <AccountType/>
-      </UserInfo>
-    </APAuthor>
-    <EditorialStatus xmlns="9d035d7d-02e5-4a00-8b62-9a556aabc7b5">Complete</EditorialStatus>
-    <PublishTargets xmlns="9d035d7d-02e5-4a00-8b62-9a556aabc7b5">OfficeOnlineVNext</PublishTargets>
-    <TPLaunchHelpLinkType xmlns="9d035d7d-02e5-4a00-8b62-9a556aabc7b5">Template</TPLaunchHelpLinkType>
-    <ScenarioTagsTaxHTField0 xmlns="9d035d7d-02e5-4a00-8b62-9a556aabc7b5">
-      <Terms xmlns="http://schemas.microsoft.com/office/infopath/2007/PartnerControls"/>
-    </ScenarioTagsTaxHTField0>
-    <OriginalRelease xmlns="9d035d7d-02e5-4a00-8b62-9a556aabc7b5">15</OriginalRelease>
-    <AssetStart xmlns="9d035d7d-02e5-4a00-8b62-9a556aabc7b5">2012-11-22T07:55:00+00:00</AssetStart>
-    <LocalizationTagsTaxHTField0 xmlns="9d035d7d-02e5-4a00-8b62-9a556aabc7b5">
-      <Terms xmlns="http://schemas.microsoft.com/office/infopath/2007/PartnerControls"/>
-    </LocalizationTagsTaxHTField0>
-    <TPClientViewer xmlns="9d035d7d-02e5-4a00-8b62-9a556aabc7b5" xsi:nil="true"/>
-    <CSXHash xmlns="9d035d7d-02e5-4a00-8b62-9a556aabc7b5" xsi:nil="true"/>
-    <IsDeleted xmlns="9d035d7d-02e5-4a00-8b62-9a556aabc7b5">false</IsDeleted>
-    <ShowIn xmlns="9d035d7d-02e5-4a00-8b62-9a556aabc7b5">Show everywhere</ShowIn>
-    <UANotes xmlns="9d035d7d-02e5-4a00-8b62-9a556aabc7b5" xsi:nil="true"/>
-    <TemplateStatus xmlns="9d035d7d-02e5-4a00-8b62-9a556aabc7b5">Complete</TemplateStatus>
-    <Downloads xmlns="9d035d7d-02e5-4a00-8b62-9a556aabc7b5">0</Downloads>
-    <InternalTagsTaxHTField0 xmlns="9d035d7d-02e5-4a00-8b62-9a556aabc7b5">
-      <Terms xmlns="http://schemas.microsoft.com/office/infopath/2007/PartnerControls"/>
-    </InternalTagsTaxHTField0>
-    <TPExecutable xmlns="9d035d7d-02e5-4a00-8b62-9a556aabc7b5" xsi:nil="true"/>
-    <AssetType xmlns="9d035d7d-02e5-4a00-8b62-9a556aabc7b5">TP</AssetType>
-    <Milestone xmlns="9d035d7d-02e5-4a00-8b62-9a556aabc7b5" xsi:nil="true"/>
-    <OriginAsset xmlns="9d035d7d-02e5-4a00-8b62-9a556aabc7b5" xsi:nil="true"/>
-    <TPComponent xmlns="9d035d7d-02e5-4a00-8b62-9a556aabc7b5" xsi:nil="true"/>
-    <ApprovalStatus xmlns="9d035d7d-02e5-4a00-8b62-9a556aabc7b5">InProgress</ApprovalStatus>
-    <BlockPublish xmlns="9d035d7d-02e5-4a00-8b62-9a556aabc7b5">false</BlockPublish>
-    <EditorialTags xmlns="9d035d7d-02e5-4a00-8b62-9a556aabc7b5" xsi:nil="true"/>
-    <MarketSpecific xmlns="9d035d7d-02e5-4a00-8b62-9a556aabc7b5">false</MarketSpecific>
-    <LocComments xmlns="9d035d7d-02e5-4a00-8b62-9a556aabc7b5" xsi:nil="true"/>
-    <VoteCount xmlns="9d035d7d-02e5-4a00-8b62-9a556aabc7b5" xsi:nil="true"/>
-    <HandoffToMSDN xmlns="9d035d7d-02e5-4a00-8b62-9a556aabc7b5" xsi:nil="true"/>
-    <IntlLangReview xmlns="9d035d7d-02e5-4a00-8b62-9a556aabc7b5">false</IntlLangReview>
-    <NumericId xmlns="9d035d7d-02e5-4a00-8b62-9a556aabc7b5" xsi:nil="true"/>
-    <OOCacheId xmlns="9d035d7d-02e5-4a00-8b62-9a556aabc7b5" xsi:nil="true"/>
-    <ClipArtFilename xmlns="9d035d7d-02e5-4a00-8b62-9a556aabc7b5" xsi:nil="true"/>
-    <LastHandOff xmlns="9d035d7d-02e5-4a00-8b62-9a556aabc7b5" xsi:nil="true"/>
-    <Providers xmlns="9d035d7d-02e5-4a00-8b62-9a556aabc7b5" xsi:nil="true"/>
-    <UALocComments xmlns="9d035d7d-02e5-4a00-8b62-9a556aabc7b5" xsi:nil="true"/>
-    <DSATActionTaken xmlns="9d035d7d-02e5-4a00-8b62-9a556aabc7b5" xsi:nil="true"/>
-    <PolicheckWords xmlns="9d035d7d-02e5-4a00-8b62-9a556aabc7b5" xsi:nil="true"/>
-    <TaxCatchAll xmlns="9d035d7d-02e5-4a00-8b62-9a556aabc7b5"/>
-    <BugNumber xmlns="9d035d7d-02e5-4a00-8b62-9a556aabc7b5" xsi:nil="true"/>
-    <LocRecommendedHandoff xmlns="9d035d7d-02e5-4a00-8b62-9a556aabc7b5" xsi:nil="true"/>
-    <ThumbnailAssetId xmlns="9d035d7d-02e5-4a00-8b62-9a556aabc7b5" xsi:nil="true"/>
-    <UALocRecommendation xmlns="9d035d7d-02e5-4a00-8b62-9a556aabc7b5">Localize</UALocRecommendation>
-    <APEditor xmlns="9d035d7d-02e5-4a00-8b62-9a556aabc7b5">
-      <UserInfo>
-        <DisplayName/>
-        <AccountId xsi:nil="true"/>
-        <AccountType/>
-      </UserInfo>
-    </APEditor>
-    <PrimaryImageGen xmlns="9d035d7d-02e5-4a00-8b62-9a556aabc7b5">false</PrimaryImageGen>
-    <Manager xmlns="9d035d7d-02e5-4a00-8b62-9a556aabc7b5" xsi:nil="true"/>
-    <ParentAssetId xmlns="9d035d7d-02e5-4a00-8b62-9a556aabc7b5" xsi:nil="true"/>
-    <SubmitterId xmlns="9d035d7d-02e5-4a00-8b62-9a556aabc7b5" xsi:nil="true"/>
-    <APDescription xmlns="9d035d7d-02e5-4a00-8b62-9a556aabc7b5" xsi:nil="true"/>
-    <UAProjectedTotalWords xmlns="9d035d7d-02e5-4a00-8b62-9a556aabc7b5" xsi:nil="true"/>
-    <Provider xmlns="9d035d7d-02e5-4a00-8b62-9a556aabc7b5" xsi:nil="true"/>
-    <ApprovalLog xmlns="9d035d7d-02e5-4a00-8b62-9a556aabc7b5" xsi:nil="true"/>
-    <BusinessGroup xmlns="9d035d7d-02e5-4a00-8b62-9a556aabc7b5" xsi:nil="true"/>
-    <RecommendationsModifier xmlns="9d035d7d-02e5-4a00-8b62-9a556aabc7b5" xsi:nil="true"/>
-    <Component xmlns="91e8d559-4d54-460d-ba58-5d5027f88b4d" xsi:nil="true"/>
-    <AcquiredFrom xmlns="9d035d7d-02e5-4a00-8b62-9a556aabc7b5">Internal MS</AcquiredFrom>
-    <CSXSubmissionMarket xmlns="9d035d7d-02e5-4a00-8b62-9a556aabc7b5" xsi:nil="true"/>
-    <ArtSampleDocs xmlns="9d035d7d-02e5-4a00-8b62-9a556aabc7b5" xsi:nil="true"/>
-    <IntlLangReviewDate xmlns="9d035d7d-02e5-4a00-8b62-9a556aabc7b5" xsi:nil="true"/>
-    <AverageRating xmlns="9d035d7d-02e5-4a00-8b62-9a556aabc7b5" xsi:nil="true"/>
-    <FriendlyTitle xmlns="9d035d7d-02e5-4a00-8b62-9a556aabc7b5" xsi:nil="true"/>
-    <LastModifiedDateTime xmlns="9d035d7d-02e5-4a00-8b62-9a556aabc7b5" xsi:nil="true"/>
-    <LegacyData xmlns="9d035d7d-02e5-4a00-8b62-9a556aabc7b5" xsi:nil="true"/>
-    <LocManualTestRequired xmlns="9d035d7d-02e5-4a00-8b62-9a556aabc7b5">false</LocManualTestRequired>
-    <TimesCloned xmlns="9d035d7d-02e5-4a00-8b62-9a556aabc7b5" xsi:nil="true"/>
-    <ContentItem xmlns="9d035d7d-02e5-4a00-8b62-9a556aabc7b5" xsi:nil="true"/>
-    <UACurrentWords xmlns="9d035d7d-02e5-4a00-8b62-9a556aabc7b5" xsi:nil="true"/>
-    <AssetExpire xmlns="9d035d7d-02e5-4a00-8b62-9a556aabc7b5">2029-01-01T00:00:00+00:00</AssetExpire>
-    <MachineTranslated xmlns="9d035d7d-02e5-4a00-8b62-9a556aabc7b5">false</MachineTranslated>
-    <OutputCachingOn xmlns="9d035d7d-02e5-4a00-8b62-9a556aabc7b5">false</OutputCachingOn>
-    <PlannedPubDate xmlns="9d035d7d-02e5-4a00-8b62-9a556aabc7b5" xsi:nil="true"/>
-    <Description0 xmlns="91e8d559-4d54-460d-ba58-5d5027f88b4d" xsi:nil="true"/>
-    <CSXUpdate xmlns="9d035d7d-02e5-4a00-8b62-9a556aabc7b5">false</CSXUpdate>
-    <IntlLangReviewer xmlns="9d035d7d-02e5-4a00-8b62-9a556aabc7b5" xsi:nil="true"/>
-    <IntlLocPriority xmlns="9d035d7d-02e5-4a00-8b62-9a556aabc7b5" xsi:nil="true"/>
-    <CSXSubmissionDate xmlns="9d035d7d-02e5-4a00-8b62-9a556aabc7b5" xsi:nil="true"/>
-  </documentManagement>
-</p:properties>
-</file>
-
-<file path=customXml/item2.xml><?xml version="1.0" encoding="utf-8"?>
 <ct:contentTypeSchema xmlns:ct="http://schemas.microsoft.com/office/2006/metadata/contentType" xmlns:ma="http://schemas.microsoft.com/office/2006/metadata/properties/metaAttributes" ct:_="" ma:_="" ma:contentTypeName="TemplateFile" ma:contentTypeID="0x010100BB2780C3CC07BD4BAA623FF9571645580400D1570604EA743043A2641365C0E91715" ma:contentTypeVersion="55" ma:contentTypeDescription="Create a new document." ma:contentTypeScope="" ma:versionID="2c496a0f341a72d7e8cbd42eb499a6d4">
   <xsd:schema xmlns:xsd="http://www.w3.org/2001/XMLSchema" xmlns:xs="http://www.w3.org/2001/XMLSchema" xmlns:p="http://schemas.microsoft.com/office/2006/metadata/properties" xmlns:ns2="9d035d7d-02e5-4a00-8b62-9a556aabc7b5" xmlns:ns3="91e8d559-4d54-460d-ba58-5d5027f88b4d" targetNamespace="http://schemas.microsoft.com/office/2006/metadata/properties" ma:root="true" ma:fieldsID="2bcea688bd265da693c2f253e50f4ab0" ns2:_="" ns3:_="">
     <xsd:import namespace="9d035d7d-02e5-4a00-8b62-9a556aabc7b5"/>
@@ -11671,6 +12182,134 @@
 </ct:contentTypeSchema>
 </file>
 
+<file path=customXml/item2.xml><?xml version="1.0" encoding="utf-8"?>
+<p:properties xmlns:p="http://schemas.microsoft.com/office/2006/metadata/properties" xmlns:xsi="http://www.w3.org/2001/XMLSchema-instance" xmlns:pc="http://schemas.microsoft.com/office/infopath/2007/PartnerControls">
+  <documentManagement>
+    <DirectSourceMarket xmlns="9d035d7d-02e5-4a00-8b62-9a556aabc7b5">english</DirectSourceMarket>
+    <AssetId xmlns="9d035d7d-02e5-4a00-8b62-9a556aabc7b5">TP103896547</AssetId>
+    <TPFriendlyName xmlns="9d035d7d-02e5-4a00-8b62-9a556aabc7b5" xsi:nil="true"/>
+    <SourceTitle xmlns="9d035d7d-02e5-4a00-8b62-9a556aabc7b5" xsi:nil="true"/>
+    <TPApplication xmlns="9d035d7d-02e5-4a00-8b62-9a556aabc7b5" xsi:nil="true"/>
+    <TPLaunchHelpLink xmlns="9d035d7d-02e5-4a00-8b62-9a556aabc7b5" xsi:nil="true"/>
+    <OpenTemplate xmlns="9d035d7d-02e5-4a00-8b62-9a556aabc7b5">true</OpenTemplate>
+    <CrawlForDependencies xmlns="9d035d7d-02e5-4a00-8b62-9a556aabc7b5">false</CrawlForDependencies>
+    <TrustLevel xmlns="9d035d7d-02e5-4a00-8b62-9a556aabc7b5">1 Microsoft Managed Content</TrustLevel>
+    <FeatureTagsTaxHTField0 xmlns="9d035d7d-02e5-4a00-8b62-9a556aabc7b5">
+      <Terms xmlns="http://schemas.microsoft.com/office/infopath/2007/PartnerControls"/>
+    </FeatureTagsTaxHTField0>
+    <PublishStatusLookup xmlns="9d035d7d-02e5-4a00-8b62-9a556aabc7b5">
+      <Value>488331</Value>
+    </PublishStatusLookup>
+    <LocLastLocAttemptVersionLookup xmlns="9d035d7d-02e5-4a00-8b62-9a556aabc7b5" xsi:nil="true"/>
+    <CampaignTagsTaxHTField0 xmlns="9d035d7d-02e5-4a00-8b62-9a556aabc7b5">
+      <Terms xmlns="http://schemas.microsoft.com/office/infopath/2007/PartnerControls"/>
+    </CampaignTagsTaxHTField0>
+    <IsSearchable xmlns="9d035d7d-02e5-4a00-8b62-9a556aabc7b5">true</IsSearchable>
+    <TPNamespace xmlns="9d035d7d-02e5-4a00-8b62-9a556aabc7b5" xsi:nil="true"/>
+    <TemplateTemplateType xmlns="9d035d7d-02e5-4a00-8b62-9a556aabc7b5">PowerPoint Presentation Template</TemplateTemplateType>
+    <Markets xmlns="9d035d7d-02e5-4a00-8b62-9a556aabc7b5"/>
+    <OriginalSourceMarket xmlns="9d035d7d-02e5-4a00-8b62-9a556aabc7b5">english</OriginalSourceMarket>
+    <TPInstallLocation xmlns="9d035d7d-02e5-4a00-8b62-9a556aabc7b5" xsi:nil="true"/>
+    <LocMarketGroupTiers2 xmlns="9d035d7d-02e5-4a00-8b62-9a556aabc7b5" xsi:nil="true"/>
+    <TPAppVersion xmlns="9d035d7d-02e5-4a00-8b62-9a556aabc7b5" xsi:nil="true"/>
+    <TPCommandLine xmlns="9d035d7d-02e5-4a00-8b62-9a556aabc7b5" xsi:nil="true"/>
+    <APAuthor xmlns="9d035d7d-02e5-4a00-8b62-9a556aabc7b5">
+      <UserInfo>
+        <DisplayName>System Account</DisplayName>
+        <AccountId>1073741823</AccountId>
+        <AccountType/>
+      </UserInfo>
+    </APAuthor>
+    <EditorialStatus xmlns="9d035d7d-02e5-4a00-8b62-9a556aabc7b5">Complete</EditorialStatus>
+    <PublishTargets xmlns="9d035d7d-02e5-4a00-8b62-9a556aabc7b5">OfficeOnlineVNext</PublishTargets>
+    <TPLaunchHelpLinkType xmlns="9d035d7d-02e5-4a00-8b62-9a556aabc7b5">Template</TPLaunchHelpLinkType>
+    <ScenarioTagsTaxHTField0 xmlns="9d035d7d-02e5-4a00-8b62-9a556aabc7b5">
+      <Terms xmlns="http://schemas.microsoft.com/office/infopath/2007/PartnerControls"/>
+    </ScenarioTagsTaxHTField0>
+    <OriginalRelease xmlns="9d035d7d-02e5-4a00-8b62-9a556aabc7b5">15</OriginalRelease>
+    <AssetStart xmlns="9d035d7d-02e5-4a00-8b62-9a556aabc7b5">2012-11-22T07:55:00+00:00</AssetStart>
+    <LocalizationTagsTaxHTField0 xmlns="9d035d7d-02e5-4a00-8b62-9a556aabc7b5">
+      <Terms xmlns="http://schemas.microsoft.com/office/infopath/2007/PartnerControls"/>
+    </LocalizationTagsTaxHTField0>
+    <TPClientViewer xmlns="9d035d7d-02e5-4a00-8b62-9a556aabc7b5" xsi:nil="true"/>
+    <CSXHash xmlns="9d035d7d-02e5-4a00-8b62-9a556aabc7b5" xsi:nil="true"/>
+    <IsDeleted xmlns="9d035d7d-02e5-4a00-8b62-9a556aabc7b5">false</IsDeleted>
+    <ShowIn xmlns="9d035d7d-02e5-4a00-8b62-9a556aabc7b5">Show everywhere</ShowIn>
+    <UANotes xmlns="9d035d7d-02e5-4a00-8b62-9a556aabc7b5" xsi:nil="true"/>
+    <TemplateStatus xmlns="9d035d7d-02e5-4a00-8b62-9a556aabc7b5">Complete</TemplateStatus>
+    <Downloads xmlns="9d035d7d-02e5-4a00-8b62-9a556aabc7b5">0</Downloads>
+    <InternalTagsTaxHTField0 xmlns="9d035d7d-02e5-4a00-8b62-9a556aabc7b5">
+      <Terms xmlns="http://schemas.microsoft.com/office/infopath/2007/PartnerControls"/>
+    </InternalTagsTaxHTField0>
+    <TPExecutable xmlns="9d035d7d-02e5-4a00-8b62-9a556aabc7b5" xsi:nil="true"/>
+    <AssetType xmlns="9d035d7d-02e5-4a00-8b62-9a556aabc7b5">TP</AssetType>
+    <Milestone xmlns="9d035d7d-02e5-4a00-8b62-9a556aabc7b5" xsi:nil="true"/>
+    <OriginAsset xmlns="9d035d7d-02e5-4a00-8b62-9a556aabc7b5" xsi:nil="true"/>
+    <TPComponent xmlns="9d035d7d-02e5-4a00-8b62-9a556aabc7b5" xsi:nil="true"/>
+    <ApprovalStatus xmlns="9d035d7d-02e5-4a00-8b62-9a556aabc7b5">InProgress</ApprovalStatus>
+    <BlockPublish xmlns="9d035d7d-02e5-4a00-8b62-9a556aabc7b5">false</BlockPublish>
+    <EditorialTags xmlns="9d035d7d-02e5-4a00-8b62-9a556aabc7b5" xsi:nil="true"/>
+    <MarketSpecific xmlns="9d035d7d-02e5-4a00-8b62-9a556aabc7b5">false</MarketSpecific>
+    <LocComments xmlns="9d035d7d-02e5-4a00-8b62-9a556aabc7b5" xsi:nil="true"/>
+    <VoteCount xmlns="9d035d7d-02e5-4a00-8b62-9a556aabc7b5" xsi:nil="true"/>
+    <HandoffToMSDN xmlns="9d035d7d-02e5-4a00-8b62-9a556aabc7b5" xsi:nil="true"/>
+    <IntlLangReview xmlns="9d035d7d-02e5-4a00-8b62-9a556aabc7b5">false</IntlLangReview>
+    <NumericId xmlns="9d035d7d-02e5-4a00-8b62-9a556aabc7b5" xsi:nil="true"/>
+    <OOCacheId xmlns="9d035d7d-02e5-4a00-8b62-9a556aabc7b5" xsi:nil="true"/>
+    <ClipArtFilename xmlns="9d035d7d-02e5-4a00-8b62-9a556aabc7b5" xsi:nil="true"/>
+    <LastHandOff xmlns="9d035d7d-02e5-4a00-8b62-9a556aabc7b5" xsi:nil="true"/>
+    <Providers xmlns="9d035d7d-02e5-4a00-8b62-9a556aabc7b5" xsi:nil="true"/>
+    <UALocComments xmlns="9d035d7d-02e5-4a00-8b62-9a556aabc7b5" xsi:nil="true"/>
+    <DSATActionTaken xmlns="9d035d7d-02e5-4a00-8b62-9a556aabc7b5" xsi:nil="true"/>
+    <PolicheckWords xmlns="9d035d7d-02e5-4a00-8b62-9a556aabc7b5" xsi:nil="true"/>
+    <TaxCatchAll xmlns="9d035d7d-02e5-4a00-8b62-9a556aabc7b5"/>
+    <BugNumber xmlns="9d035d7d-02e5-4a00-8b62-9a556aabc7b5" xsi:nil="true"/>
+    <LocRecommendedHandoff xmlns="9d035d7d-02e5-4a00-8b62-9a556aabc7b5" xsi:nil="true"/>
+    <ThumbnailAssetId xmlns="9d035d7d-02e5-4a00-8b62-9a556aabc7b5" xsi:nil="true"/>
+    <UALocRecommendation xmlns="9d035d7d-02e5-4a00-8b62-9a556aabc7b5">Localize</UALocRecommendation>
+    <APEditor xmlns="9d035d7d-02e5-4a00-8b62-9a556aabc7b5">
+      <UserInfo>
+        <DisplayName/>
+        <AccountId xsi:nil="true"/>
+        <AccountType/>
+      </UserInfo>
+    </APEditor>
+    <PrimaryImageGen xmlns="9d035d7d-02e5-4a00-8b62-9a556aabc7b5">false</PrimaryImageGen>
+    <Manager xmlns="9d035d7d-02e5-4a00-8b62-9a556aabc7b5" xsi:nil="true"/>
+    <ParentAssetId xmlns="9d035d7d-02e5-4a00-8b62-9a556aabc7b5" xsi:nil="true"/>
+    <SubmitterId xmlns="9d035d7d-02e5-4a00-8b62-9a556aabc7b5" xsi:nil="true"/>
+    <APDescription xmlns="9d035d7d-02e5-4a00-8b62-9a556aabc7b5" xsi:nil="true"/>
+    <UAProjectedTotalWords xmlns="9d035d7d-02e5-4a00-8b62-9a556aabc7b5" xsi:nil="true"/>
+    <Provider xmlns="9d035d7d-02e5-4a00-8b62-9a556aabc7b5" xsi:nil="true"/>
+    <ApprovalLog xmlns="9d035d7d-02e5-4a00-8b62-9a556aabc7b5" xsi:nil="true"/>
+    <BusinessGroup xmlns="9d035d7d-02e5-4a00-8b62-9a556aabc7b5" xsi:nil="true"/>
+    <RecommendationsModifier xmlns="9d035d7d-02e5-4a00-8b62-9a556aabc7b5" xsi:nil="true"/>
+    <Component xmlns="91e8d559-4d54-460d-ba58-5d5027f88b4d" xsi:nil="true"/>
+    <AcquiredFrom xmlns="9d035d7d-02e5-4a00-8b62-9a556aabc7b5">Internal MS</AcquiredFrom>
+    <CSXSubmissionMarket xmlns="9d035d7d-02e5-4a00-8b62-9a556aabc7b5" xsi:nil="true"/>
+    <ArtSampleDocs xmlns="9d035d7d-02e5-4a00-8b62-9a556aabc7b5" xsi:nil="true"/>
+    <IntlLangReviewDate xmlns="9d035d7d-02e5-4a00-8b62-9a556aabc7b5" xsi:nil="true"/>
+    <AverageRating xmlns="9d035d7d-02e5-4a00-8b62-9a556aabc7b5" xsi:nil="true"/>
+    <FriendlyTitle xmlns="9d035d7d-02e5-4a00-8b62-9a556aabc7b5" xsi:nil="true"/>
+    <LastModifiedDateTime xmlns="9d035d7d-02e5-4a00-8b62-9a556aabc7b5" xsi:nil="true"/>
+    <LegacyData xmlns="9d035d7d-02e5-4a00-8b62-9a556aabc7b5" xsi:nil="true"/>
+    <LocManualTestRequired xmlns="9d035d7d-02e5-4a00-8b62-9a556aabc7b5">false</LocManualTestRequired>
+    <TimesCloned xmlns="9d035d7d-02e5-4a00-8b62-9a556aabc7b5" xsi:nil="true"/>
+    <ContentItem xmlns="9d035d7d-02e5-4a00-8b62-9a556aabc7b5" xsi:nil="true"/>
+    <UACurrentWords xmlns="9d035d7d-02e5-4a00-8b62-9a556aabc7b5" xsi:nil="true"/>
+    <AssetExpire xmlns="9d035d7d-02e5-4a00-8b62-9a556aabc7b5">2029-01-01T00:00:00+00:00</AssetExpire>
+    <MachineTranslated xmlns="9d035d7d-02e5-4a00-8b62-9a556aabc7b5">false</MachineTranslated>
+    <OutputCachingOn xmlns="9d035d7d-02e5-4a00-8b62-9a556aabc7b5">false</OutputCachingOn>
+    <PlannedPubDate xmlns="9d035d7d-02e5-4a00-8b62-9a556aabc7b5" xsi:nil="true"/>
+    <Description0 xmlns="91e8d559-4d54-460d-ba58-5d5027f88b4d" xsi:nil="true"/>
+    <CSXUpdate xmlns="9d035d7d-02e5-4a00-8b62-9a556aabc7b5">false</CSXUpdate>
+    <IntlLangReviewer xmlns="9d035d7d-02e5-4a00-8b62-9a556aabc7b5" xsi:nil="true"/>
+    <IntlLocPriority xmlns="9d035d7d-02e5-4a00-8b62-9a556aabc7b5" xsi:nil="true"/>
+    <CSXSubmissionDate xmlns="9d035d7d-02e5-4a00-8b62-9a556aabc7b5" xsi:nil="true"/>
+  </documentManagement>
+</p:properties>
+</file>
+
 <file path=customXml/item3.xml><?xml version="1.0" encoding="utf-8"?>
 <?mso-contentType ?>
 <FormTemplates xmlns="http://schemas.microsoft.com/sharepoint/v3/contenttype/forms">
@@ -11681,17 +12320,6 @@
 </file>
 
 <file path=customXml/itemProps1.xml><?xml version="1.0" encoding="utf-8"?>
-<ds:datastoreItem xmlns:ds="http://schemas.openxmlformats.org/officeDocument/2006/customXml" ds:itemID="{ADDEBFBB-03C0-4D8C-ADFF-0CE8FE71CAE2}">
-  <ds:schemaRefs>
-    <ds:schemaRef ds:uri="http://schemas.microsoft.com/office/2006/metadata/properties"/>
-    <ds:schemaRef ds:uri="http://schemas.microsoft.com/office/infopath/2007/PartnerControls"/>
-    <ds:schemaRef ds:uri="9d035d7d-02e5-4a00-8b62-9a556aabc7b5"/>
-    <ds:schemaRef ds:uri="91e8d559-4d54-460d-ba58-5d5027f88b4d"/>
-  </ds:schemaRefs>
-</ds:datastoreItem>
-</file>
-
-<file path=customXml/itemProps2.xml><?xml version="1.0" encoding="utf-8"?>
 <ds:datastoreItem xmlns:ds="http://schemas.openxmlformats.org/officeDocument/2006/customXml" ds:itemID="{75B8C406-F646-4A28-AEBF-1C538A263F94}">
   <ds:schemaRefs>
     <ds:schemaRef ds:uri="http://schemas.microsoft.com/office/2006/metadata/contentType"/>
@@ -11710,6 +12338,17 @@
 </ds:datastoreItem>
 </file>
 
+<file path=customXml/itemProps2.xml><?xml version="1.0" encoding="utf-8"?>
+<ds:datastoreItem xmlns:ds="http://schemas.openxmlformats.org/officeDocument/2006/customXml" ds:itemID="{ADDEBFBB-03C0-4D8C-ADFF-0CE8FE71CAE2}">
+  <ds:schemaRefs>
+    <ds:schemaRef ds:uri="http://schemas.microsoft.com/office/2006/metadata/properties"/>
+    <ds:schemaRef ds:uri="http://schemas.microsoft.com/office/infopath/2007/PartnerControls"/>
+    <ds:schemaRef ds:uri="9d035d7d-02e5-4a00-8b62-9a556aabc7b5"/>
+    <ds:schemaRef ds:uri="91e8d559-4d54-460d-ba58-5d5027f88b4d"/>
+  </ds:schemaRefs>
+</ds:datastoreItem>
+</file>
+
 <file path=customXml/itemProps3.xml><?xml version="1.0" encoding="utf-8"?>
 <ds:datastoreItem xmlns:ds="http://schemas.openxmlformats.org/officeDocument/2006/customXml" ds:itemID="{434E3DA7-0DFA-4BD3-BB8A-18E58D1B0DB1}">
   <ds:schemaRefs>

</xml_diff>